<commit_message>
referencia de arte nas telas
</commit_message>
<xml_diff>
--- a/Documentacao Projeto/Protótipo_Visual.pptx
+++ b/Documentacao Projeto/Protótipo_Visual.pptx
@@ -259,7 +259,7 @@
           <a:p>
             <a:fld id="{ED8D6B47-35E8-4B74-A8BC-163E56BA4F07}" type="datetimeFigureOut">
               <a:rPr lang="pt-BR" smtClean="0"/>
-              <a:t>22/03/2020</a:t>
+              <a:t>23/03/2020</a:t>
             </a:fld>
             <a:endParaRPr lang="pt-BR"/>
           </a:p>
@@ -429,7 +429,7 @@
           <a:p>
             <a:fld id="{ED8D6B47-35E8-4B74-A8BC-163E56BA4F07}" type="datetimeFigureOut">
               <a:rPr lang="pt-BR" smtClean="0"/>
-              <a:t>22/03/2020</a:t>
+              <a:t>23/03/2020</a:t>
             </a:fld>
             <a:endParaRPr lang="pt-BR"/>
           </a:p>
@@ -609,7 +609,7 @@
           <a:p>
             <a:fld id="{ED8D6B47-35E8-4B74-A8BC-163E56BA4F07}" type="datetimeFigureOut">
               <a:rPr lang="pt-BR" smtClean="0"/>
-              <a:t>22/03/2020</a:t>
+              <a:t>23/03/2020</a:t>
             </a:fld>
             <a:endParaRPr lang="pt-BR"/>
           </a:p>
@@ -779,7 +779,7 @@
           <a:p>
             <a:fld id="{ED8D6B47-35E8-4B74-A8BC-163E56BA4F07}" type="datetimeFigureOut">
               <a:rPr lang="pt-BR" smtClean="0"/>
-              <a:t>22/03/2020</a:t>
+              <a:t>23/03/2020</a:t>
             </a:fld>
             <a:endParaRPr lang="pt-BR"/>
           </a:p>
@@ -1025,7 +1025,7 @@
           <a:p>
             <a:fld id="{ED8D6B47-35E8-4B74-A8BC-163E56BA4F07}" type="datetimeFigureOut">
               <a:rPr lang="pt-BR" smtClean="0"/>
-              <a:t>22/03/2020</a:t>
+              <a:t>23/03/2020</a:t>
             </a:fld>
             <a:endParaRPr lang="pt-BR"/>
           </a:p>
@@ -1257,7 +1257,7 @@
           <a:p>
             <a:fld id="{ED8D6B47-35E8-4B74-A8BC-163E56BA4F07}" type="datetimeFigureOut">
               <a:rPr lang="pt-BR" smtClean="0"/>
-              <a:t>22/03/2020</a:t>
+              <a:t>23/03/2020</a:t>
             </a:fld>
             <a:endParaRPr lang="pt-BR"/>
           </a:p>
@@ -1624,7 +1624,7 @@
           <a:p>
             <a:fld id="{ED8D6B47-35E8-4B74-A8BC-163E56BA4F07}" type="datetimeFigureOut">
               <a:rPr lang="pt-BR" smtClean="0"/>
-              <a:t>22/03/2020</a:t>
+              <a:t>23/03/2020</a:t>
             </a:fld>
             <a:endParaRPr lang="pt-BR"/>
           </a:p>
@@ -1742,7 +1742,7 @@
           <a:p>
             <a:fld id="{ED8D6B47-35E8-4B74-A8BC-163E56BA4F07}" type="datetimeFigureOut">
               <a:rPr lang="pt-BR" smtClean="0"/>
-              <a:t>22/03/2020</a:t>
+              <a:t>23/03/2020</a:t>
             </a:fld>
             <a:endParaRPr lang="pt-BR"/>
           </a:p>
@@ -1837,7 +1837,7 @@
           <a:p>
             <a:fld id="{ED8D6B47-35E8-4B74-A8BC-163E56BA4F07}" type="datetimeFigureOut">
               <a:rPr lang="pt-BR" smtClean="0"/>
-              <a:t>22/03/2020</a:t>
+              <a:t>23/03/2020</a:t>
             </a:fld>
             <a:endParaRPr lang="pt-BR"/>
           </a:p>
@@ -2114,7 +2114,7 @@
           <a:p>
             <a:fld id="{ED8D6B47-35E8-4B74-A8BC-163E56BA4F07}" type="datetimeFigureOut">
               <a:rPr lang="pt-BR" smtClean="0"/>
-              <a:t>22/03/2020</a:t>
+              <a:t>23/03/2020</a:t>
             </a:fld>
             <a:endParaRPr lang="pt-BR"/>
           </a:p>
@@ -2367,7 +2367,7 @@
           <a:p>
             <a:fld id="{ED8D6B47-35E8-4B74-A8BC-163E56BA4F07}" type="datetimeFigureOut">
               <a:rPr lang="pt-BR" smtClean="0"/>
-              <a:t>22/03/2020</a:t>
+              <a:t>23/03/2020</a:t>
             </a:fld>
             <a:endParaRPr lang="pt-BR"/>
           </a:p>
@@ -2580,7 +2580,7 @@
           <a:p>
             <a:fld id="{ED8D6B47-35E8-4B74-A8BC-163E56BA4F07}" type="datetimeFigureOut">
               <a:rPr lang="pt-BR" smtClean="0"/>
-              <a:t>22/03/2020</a:t>
+              <a:t>23/03/2020</a:t>
             </a:fld>
             <a:endParaRPr lang="pt-BR"/>
           </a:p>
@@ -9506,8 +9506,8 @@
         </p:nvGrpSpPr>
         <p:grpSpPr>
           <a:xfrm>
-            <a:off x="2714099" y="1485501"/>
-            <a:ext cx="8104155" cy="3854800"/>
+            <a:off x="1287887" y="1485501"/>
+            <a:ext cx="9530367" cy="3854800"/>
             <a:chOff x="3303102" y="1578846"/>
             <a:chExt cx="7132734" cy="4364070"/>
           </a:xfrm>
@@ -9607,31 +9607,24 @@
       </p:grpSp>
       <p:sp>
         <p:nvSpPr>
-          <p:cNvPr id="13" name="Retângulo de cantos arredondados 12"/>
+          <p:cNvPr id="15" name="Retângulo 14"/>
           <p:cNvSpPr/>
           <p:nvPr/>
         </p:nvSpPr>
         <p:spPr>
           <a:xfrm>
-            <a:off x="1285073" y="1470123"/>
-            <a:ext cx="1290702" cy="3854800"/>
-          </a:xfrm>
-          <a:prstGeom prst="roundRect">
+            <a:off x="1146749" y="445761"/>
+            <a:ext cx="9787944" cy="764853"/>
+          </a:xfrm>
+          <a:prstGeom prst="rect">
             <a:avLst/>
           </a:prstGeom>
           <a:solidFill>
-            <a:srgbClr val="FDEBC7"/>
+            <a:srgbClr val="8DBA62"/>
           </a:solidFill>
           <a:ln>
             <a:noFill/>
           </a:ln>
-          <a:effectLst>
-            <a:outerShdw blurRad="50800" dist="38100" dir="2700000" algn="tl" rotWithShape="0">
-              <a:prstClr val="black">
-                <a:alpha val="40000"/>
-              </a:prstClr>
-            </a:outerShdw>
-          </a:effectLst>
         </p:spPr>
         <p:style>
           <a:lnRef idx="2">
@@ -9660,14 +9653,14 @@
       </p:sp>
       <p:sp>
         <p:nvSpPr>
-          <p:cNvPr id="15" name="Retângulo 14"/>
+          <p:cNvPr id="18" name="Retângulo 17"/>
           <p:cNvSpPr/>
           <p:nvPr/>
         </p:nvSpPr>
         <p:spPr>
           <a:xfrm>
-            <a:off x="1146749" y="445761"/>
-            <a:ext cx="9787944" cy="764853"/>
+            <a:off x="1146749" y="5640946"/>
+            <a:ext cx="9787944" cy="712278"/>
           </a:xfrm>
           <a:prstGeom prst="rect">
             <a:avLst/>
@@ -9706,24 +9699,31 @@
       </p:sp>
       <p:sp>
         <p:nvSpPr>
-          <p:cNvPr id="18" name="Retângulo 17"/>
+          <p:cNvPr id="24" name="Retângulo de cantos arredondados 23"/>
           <p:cNvSpPr/>
           <p:nvPr/>
         </p:nvSpPr>
         <p:spPr>
           <a:xfrm>
-            <a:off x="1146749" y="5640946"/>
-            <a:ext cx="9787944" cy="712278"/>
-          </a:xfrm>
-          <a:prstGeom prst="rect">
+            <a:off x="1930424" y="728000"/>
+            <a:ext cx="1290702" cy="301406"/>
+          </a:xfrm>
+          <a:prstGeom prst="roundRect">
             <a:avLst/>
           </a:prstGeom>
           <a:solidFill>
-            <a:srgbClr val="8DBA62"/>
+            <a:srgbClr val="FDEBC7"/>
           </a:solidFill>
           <a:ln>
             <a:noFill/>
           </a:ln>
+          <a:effectLst>
+            <a:outerShdw blurRad="50800" dist="38100" dir="2700000" algn="tl" rotWithShape="0">
+              <a:prstClr val="black">
+                <a:alpha val="40000"/>
+              </a:prstClr>
+            </a:outerShdw>
+          </a:effectLst>
         </p:spPr>
         <p:style>
           <a:lnRef idx="2">
@@ -9746,19 +9746,61 @@
           <a:lstStyle/>
           <a:p>
             <a:pPr algn="ctr"/>
-            <a:endParaRPr lang="pt-BR"/>
-          </a:p>
-        </p:txBody>
-      </p:sp>
-      <p:sp>
-        <p:nvSpPr>
-          <p:cNvPr id="24" name="Retângulo de cantos arredondados 23"/>
+            <a:r>
+              <a:rPr lang="pt-BR" dirty="0" smtClean="0">
+                <a:solidFill>
+                  <a:schemeClr val="tx1"/>
+                </a:solidFill>
+              </a:rPr>
+              <a:t>150</a:t>
+            </a:r>
+            <a:endParaRPr lang="pt-BR" dirty="0">
+              <a:solidFill>
+                <a:schemeClr val="tx1"/>
+              </a:solidFill>
+            </a:endParaRPr>
+          </a:p>
+        </p:txBody>
+      </p:sp>
+      <p:pic>
+        <p:nvPicPr>
+          <p:cNvPr id="6" name="Imagem 5"/>
+          <p:cNvPicPr>
+            <a:picLocks noChangeAspect="1"/>
+          </p:cNvPicPr>
+          <p:nvPr/>
+        </p:nvPicPr>
+        <p:blipFill>
+          <a:blip r:embed="rId2" cstate="print">
+            <a:extLst>
+              <a:ext uri="{28A0092B-C50C-407E-A947-70E740481C1C}">
+                <a14:useLocalDpi xmlns:a14="http://schemas.microsoft.com/office/drawing/2010/main" val="0"/>
+              </a:ext>
+            </a:extLst>
+          </a:blip>
+          <a:stretch>
+            <a:fillRect/>
+          </a:stretch>
+        </p:blipFill>
+        <p:spPr>
+          <a:xfrm>
+            <a:off x="1630819" y="553340"/>
+            <a:ext cx="639397" cy="639397"/>
+          </a:xfrm>
+          <a:prstGeom prst="rect">
+            <a:avLst/>
+          </a:prstGeom>
+        </p:spPr>
+      </p:pic>
+      <p:sp>
+        <p:nvSpPr>
+          <p:cNvPr id="25" name="Retângulo de cantos arredondados 24"/>
           <p:cNvSpPr/>
           <p:nvPr/>
         </p:nvSpPr>
         <p:spPr>
           <a:xfrm>
-            <a:off x="1930424" y="728000"/>
+            <a:off x="5668875" y="818587"/>
             <a:ext cx="1290702" cy="301406"/>
           </a:xfrm>
           <a:prstGeom prst="roundRect">
@@ -9805,7 +9847,7 @@
                   <a:schemeClr val="tx1"/>
                 </a:solidFill>
               </a:rPr>
-              <a:t>150</a:t>
+              <a:t>1:35</a:t>
             </a:r>
             <a:endParaRPr lang="pt-BR" dirty="0">
               <a:solidFill>
@@ -9817,28 +9859,27 @@
       </p:sp>
       <p:pic>
         <p:nvPicPr>
-          <p:cNvPr id="6" name="Imagem 5"/>
+          <p:cNvPr id="7" name="Imagem 6"/>
           <p:cNvPicPr>
             <a:picLocks noChangeAspect="1"/>
           </p:cNvPicPr>
           <p:nvPr/>
         </p:nvPicPr>
-        <p:blipFill>
-          <a:blip r:embed="rId2" cstate="print">
+        <p:blipFill rotWithShape="1">
+          <a:blip r:embed="rId3" cstate="print">
             <a:extLst>
               <a:ext uri="{28A0092B-C50C-407E-A947-70E740481C1C}">
                 <a14:useLocalDpi xmlns:a14="http://schemas.microsoft.com/office/drawing/2010/main" val="0"/>
               </a:ext>
             </a:extLst>
           </a:blip>
-          <a:stretch>
-            <a:fillRect/>
-          </a:stretch>
+          <a:srcRect l="30573" r="27361"/>
+          <a:stretch/>
         </p:blipFill>
         <p:spPr>
           <a:xfrm>
-            <a:off x="1630819" y="553340"/>
-            <a:ext cx="639397" cy="639397"/>
+            <a:off x="5253303" y="435945"/>
+            <a:ext cx="831143" cy="987910"/>
           </a:xfrm>
           <a:prstGeom prst="rect">
             <a:avLst/>
@@ -9847,14 +9888,14 @@
       </p:pic>
       <p:sp>
         <p:nvSpPr>
-          <p:cNvPr id="25" name="Retângulo de cantos arredondados 24"/>
+          <p:cNvPr id="26" name="Retângulo de cantos arredondados 25"/>
           <p:cNvSpPr/>
           <p:nvPr/>
         </p:nvSpPr>
         <p:spPr>
           <a:xfrm>
-            <a:off x="5668875" y="818587"/>
-            <a:ext cx="1290702" cy="301406"/>
+            <a:off x="9259910" y="722334"/>
+            <a:ext cx="1183430" cy="307071"/>
           </a:xfrm>
           <a:prstGeom prst="roundRect">
             <a:avLst/>
@@ -9900,100 +9941,6 @@
                   <a:schemeClr val="tx1"/>
                 </a:solidFill>
               </a:rPr>
-              <a:t>1:35</a:t>
-            </a:r>
-            <a:endParaRPr lang="pt-BR" dirty="0">
-              <a:solidFill>
-                <a:schemeClr val="tx1"/>
-              </a:solidFill>
-            </a:endParaRPr>
-          </a:p>
-        </p:txBody>
-      </p:sp>
-      <p:pic>
-        <p:nvPicPr>
-          <p:cNvPr id="7" name="Imagem 6"/>
-          <p:cNvPicPr>
-            <a:picLocks noChangeAspect="1"/>
-          </p:cNvPicPr>
-          <p:nvPr/>
-        </p:nvPicPr>
-        <p:blipFill rotWithShape="1">
-          <a:blip r:embed="rId3" cstate="print">
-            <a:extLst>
-              <a:ext uri="{28A0092B-C50C-407E-A947-70E740481C1C}">
-                <a14:useLocalDpi xmlns:a14="http://schemas.microsoft.com/office/drawing/2010/main" val="0"/>
-              </a:ext>
-            </a:extLst>
-          </a:blip>
-          <a:srcRect l="30573" r="27361"/>
-          <a:stretch/>
-        </p:blipFill>
-        <p:spPr>
-          <a:xfrm>
-            <a:off x="5253303" y="435945"/>
-            <a:ext cx="831143" cy="987910"/>
-          </a:xfrm>
-          <a:prstGeom prst="rect">
-            <a:avLst/>
-          </a:prstGeom>
-        </p:spPr>
-      </p:pic>
-      <p:sp>
-        <p:nvSpPr>
-          <p:cNvPr id="26" name="Retângulo de cantos arredondados 25"/>
-          <p:cNvSpPr/>
-          <p:nvPr/>
-        </p:nvSpPr>
-        <p:spPr>
-          <a:xfrm>
-            <a:off x="9259910" y="722334"/>
-            <a:ext cx="1183430" cy="307071"/>
-          </a:xfrm>
-          <a:prstGeom prst="roundRect">
-            <a:avLst/>
-          </a:prstGeom>
-          <a:solidFill>
-            <a:srgbClr val="FDEBC7"/>
-          </a:solidFill>
-          <a:ln>
-            <a:noFill/>
-          </a:ln>
-          <a:effectLst>
-            <a:outerShdw blurRad="50800" dist="38100" dir="2700000" algn="tl" rotWithShape="0">
-              <a:prstClr val="black">
-                <a:alpha val="40000"/>
-              </a:prstClr>
-            </a:outerShdw>
-          </a:effectLst>
-        </p:spPr>
-        <p:style>
-          <a:lnRef idx="2">
-            <a:schemeClr val="accent1">
-              <a:shade val="50000"/>
-            </a:schemeClr>
-          </a:lnRef>
-          <a:fillRef idx="1">
-            <a:schemeClr val="accent1"/>
-          </a:fillRef>
-          <a:effectRef idx="0">
-            <a:schemeClr val="accent1"/>
-          </a:effectRef>
-          <a:fontRef idx="minor">
-            <a:schemeClr val="lt1"/>
-          </a:fontRef>
-        </p:style>
-        <p:txBody>
-          <a:bodyPr rtlCol="0" anchor="ctr"/>
-          <a:lstStyle/>
-          <a:p>
-            <a:pPr algn="ctr"/>
-            <a:r>
-              <a:rPr lang="pt-BR" dirty="0" smtClean="0">
-                <a:solidFill>
-                  <a:schemeClr val="tx1"/>
-                </a:solidFill>
-              </a:rPr>
               <a:t>2º</a:t>
             </a:r>
             <a:endParaRPr lang="pt-BR" dirty="0">
@@ -10042,8 +9989,8 @@
         </p:nvSpPr>
         <p:spPr>
           <a:xfrm>
-            <a:off x="3026535" y="1828799"/>
-            <a:ext cx="7416805" cy="1867437"/>
+            <a:off x="1560817" y="1828799"/>
+            <a:ext cx="8882523" cy="1867437"/>
           </a:xfrm>
           <a:prstGeom prst="roundRect">
             <a:avLst/>
@@ -10081,8 +10028,8 @@
         </p:nvSpPr>
         <p:spPr>
           <a:xfrm>
-            <a:off x="3026535" y="3874028"/>
-            <a:ext cx="7416805" cy="401255"/>
+            <a:off x="1560817" y="3874028"/>
+            <a:ext cx="8882523" cy="401255"/>
           </a:xfrm>
           <a:prstGeom prst="roundRect">
             <a:avLst/>
@@ -10135,8 +10082,8 @@
         </p:nvSpPr>
         <p:spPr>
           <a:xfrm>
-            <a:off x="3026533" y="4327402"/>
-            <a:ext cx="7416805" cy="401255"/>
+            <a:off x="1560817" y="4327402"/>
+            <a:ext cx="8882521" cy="401255"/>
           </a:xfrm>
           <a:prstGeom prst="roundRect">
             <a:avLst/>
@@ -10189,8 +10136,8 @@
         </p:nvSpPr>
         <p:spPr>
           <a:xfrm>
-            <a:off x="3026533" y="4780777"/>
-            <a:ext cx="7416805" cy="401255"/>
+            <a:off x="1560817" y="4780777"/>
+            <a:ext cx="8882521" cy="401255"/>
           </a:xfrm>
           <a:prstGeom prst="roundRect">
             <a:avLst/>
@@ -10243,7 +10190,7 @@
         </p:nvSpPr>
         <p:spPr>
           <a:xfrm>
-            <a:off x="3392425" y="2030887"/>
+            <a:off x="1719727" y="2191082"/>
             <a:ext cx="1501399" cy="400110"/>
           </a:xfrm>
           <a:prstGeom prst="rect">
@@ -10269,281 +10216,6 @@
               <a:t>Pergunta 1</a:t>
             </a:r>
             <a:endParaRPr lang="pt-BR" sz="2000" dirty="0">
-              <a:solidFill>
-                <a:srgbClr val="447E43"/>
-              </a:solidFill>
-              <a:latin typeface="Arial Unicode MS" panose="020B0604020202020204" pitchFamily="34" charset="-128"/>
-              <a:ea typeface="Arial Unicode MS" panose="020B0604020202020204" pitchFamily="34" charset="-128"/>
-              <a:cs typeface="Arial Unicode MS" panose="020B0604020202020204" pitchFamily="34" charset="-128"/>
-            </a:endParaRPr>
-          </a:p>
-        </p:txBody>
-      </p:sp>
-      <p:sp>
-        <p:nvSpPr>
-          <p:cNvPr id="34" name="CaixaDeTexto 33"/>
-          <p:cNvSpPr txBox="1"/>
-          <p:nvPr/>
-        </p:nvSpPr>
-        <p:spPr>
-          <a:xfrm>
-            <a:off x="1285074" y="1682879"/>
-            <a:ext cx="543726" cy="400110"/>
-          </a:xfrm>
-          <a:prstGeom prst="rect">
-            <a:avLst/>
-          </a:prstGeom>
-          <a:noFill/>
-        </p:spPr>
-        <p:txBody>
-          <a:bodyPr wrap="square" rtlCol="0">
-            <a:spAutoFit/>
-          </a:bodyPr>
-          <a:lstStyle/>
-          <a:p>
-            <a:r>
-              <a:rPr lang="pt-BR" sz="2000" dirty="0" smtClean="0">
-                <a:solidFill>
-                  <a:srgbClr val="447E43"/>
-                </a:solidFill>
-                <a:latin typeface="Arial Unicode MS" panose="020B0604020202020204" pitchFamily="34" charset="-128"/>
-                <a:ea typeface="Arial Unicode MS" panose="020B0604020202020204" pitchFamily="34" charset="-128"/>
-                <a:cs typeface="Arial Unicode MS" panose="020B0604020202020204" pitchFamily="34" charset="-128"/>
-              </a:rPr>
-              <a:t>1º</a:t>
-            </a:r>
-            <a:endParaRPr lang="pt-BR" sz="2000" dirty="0">
-              <a:solidFill>
-                <a:srgbClr val="447E43"/>
-              </a:solidFill>
-              <a:latin typeface="Arial Unicode MS" panose="020B0604020202020204" pitchFamily="34" charset="-128"/>
-              <a:ea typeface="Arial Unicode MS" panose="020B0604020202020204" pitchFamily="34" charset="-128"/>
-              <a:cs typeface="Arial Unicode MS" panose="020B0604020202020204" pitchFamily="34" charset="-128"/>
-            </a:endParaRPr>
-          </a:p>
-        </p:txBody>
-      </p:sp>
-      <p:sp>
-        <p:nvSpPr>
-          <p:cNvPr id="35" name="CaixaDeTexto 34"/>
-          <p:cNvSpPr txBox="1"/>
-          <p:nvPr/>
-        </p:nvSpPr>
-        <p:spPr>
-          <a:xfrm>
-            <a:off x="1250358" y="2156544"/>
-            <a:ext cx="543726" cy="400110"/>
-          </a:xfrm>
-          <a:prstGeom prst="rect">
-            <a:avLst/>
-          </a:prstGeom>
-          <a:noFill/>
-        </p:spPr>
-        <p:txBody>
-          <a:bodyPr wrap="square" rtlCol="0">
-            <a:spAutoFit/>
-          </a:bodyPr>
-          <a:lstStyle/>
-          <a:p>
-            <a:r>
-              <a:rPr lang="pt-BR" sz="2000" dirty="0">
-                <a:solidFill>
-                  <a:srgbClr val="447E43"/>
-                </a:solidFill>
-                <a:latin typeface="Arial Unicode MS" panose="020B0604020202020204" pitchFamily="34" charset="-128"/>
-                <a:ea typeface="Arial Unicode MS" panose="020B0604020202020204" pitchFamily="34" charset="-128"/>
-                <a:cs typeface="Arial Unicode MS" panose="020B0604020202020204" pitchFamily="34" charset="-128"/>
-              </a:rPr>
-              <a:t>2</a:t>
-            </a:r>
-            <a:r>
-              <a:rPr lang="pt-BR" sz="2000" dirty="0" smtClean="0">
-                <a:solidFill>
-                  <a:srgbClr val="447E43"/>
-                </a:solidFill>
-                <a:latin typeface="Arial Unicode MS" panose="020B0604020202020204" pitchFamily="34" charset="-128"/>
-                <a:ea typeface="Arial Unicode MS" panose="020B0604020202020204" pitchFamily="34" charset="-128"/>
-                <a:cs typeface="Arial Unicode MS" panose="020B0604020202020204" pitchFamily="34" charset="-128"/>
-              </a:rPr>
-              <a:t>º</a:t>
-            </a:r>
-            <a:endParaRPr lang="pt-BR" sz="2000" dirty="0">
-              <a:solidFill>
-                <a:srgbClr val="447E43"/>
-              </a:solidFill>
-              <a:latin typeface="Arial Unicode MS" panose="020B0604020202020204" pitchFamily="34" charset="-128"/>
-              <a:ea typeface="Arial Unicode MS" panose="020B0604020202020204" pitchFamily="34" charset="-128"/>
-              <a:cs typeface="Arial Unicode MS" panose="020B0604020202020204" pitchFamily="34" charset="-128"/>
-            </a:endParaRPr>
-          </a:p>
-        </p:txBody>
-      </p:sp>
-      <p:sp>
-        <p:nvSpPr>
-          <p:cNvPr id="36" name="CaixaDeTexto 35"/>
-          <p:cNvSpPr txBox="1"/>
-          <p:nvPr/>
-        </p:nvSpPr>
-        <p:spPr>
-          <a:xfrm>
-            <a:off x="1242518" y="2633985"/>
-            <a:ext cx="543726" cy="400110"/>
-          </a:xfrm>
-          <a:prstGeom prst="rect">
-            <a:avLst/>
-          </a:prstGeom>
-          <a:noFill/>
-        </p:spPr>
-        <p:txBody>
-          <a:bodyPr wrap="square" rtlCol="0">
-            <a:spAutoFit/>
-          </a:bodyPr>
-          <a:lstStyle/>
-          <a:p>
-            <a:r>
-              <a:rPr lang="pt-BR" sz="2000" dirty="0" smtClean="0">
-                <a:solidFill>
-                  <a:srgbClr val="447E43"/>
-                </a:solidFill>
-                <a:latin typeface="Arial Unicode MS" panose="020B0604020202020204" pitchFamily="34" charset="-128"/>
-                <a:ea typeface="Arial Unicode MS" panose="020B0604020202020204" pitchFamily="34" charset="-128"/>
-                <a:cs typeface="Arial Unicode MS" panose="020B0604020202020204" pitchFamily="34" charset="-128"/>
-              </a:rPr>
-              <a:t>3º</a:t>
-            </a:r>
-            <a:endParaRPr lang="pt-BR" sz="2000" dirty="0">
-              <a:solidFill>
-                <a:srgbClr val="447E43"/>
-              </a:solidFill>
-              <a:latin typeface="Arial Unicode MS" panose="020B0604020202020204" pitchFamily="34" charset="-128"/>
-              <a:ea typeface="Arial Unicode MS" panose="020B0604020202020204" pitchFamily="34" charset="-128"/>
-              <a:cs typeface="Arial Unicode MS" panose="020B0604020202020204" pitchFamily="34" charset="-128"/>
-            </a:endParaRPr>
-          </a:p>
-        </p:txBody>
-      </p:sp>
-      <p:sp>
-        <p:nvSpPr>
-          <p:cNvPr id="37" name="CaixaDeTexto 36"/>
-          <p:cNvSpPr txBox="1"/>
-          <p:nvPr/>
-        </p:nvSpPr>
-        <p:spPr>
-          <a:xfrm>
-            <a:off x="1630819" y="1702298"/>
-            <a:ext cx="925405" cy="338554"/>
-          </a:xfrm>
-          <a:prstGeom prst="rect">
-            <a:avLst/>
-          </a:prstGeom>
-          <a:noFill/>
-        </p:spPr>
-        <p:txBody>
-          <a:bodyPr wrap="square" rtlCol="0">
-            <a:spAutoFit/>
-          </a:bodyPr>
-          <a:lstStyle/>
-          <a:p>
-            <a:r>
-              <a:rPr lang="pt-BR" sz="1600" dirty="0" smtClean="0">
-                <a:solidFill>
-                  <a:srgbClr val="447E43"/>
-                </a:solidFill>
-                <a:latin typeface="Arial Unicode MS" panose="020B0604020202020204" pitchFamily="34" charset="-128"/>
-                <a:ea typeface="Arial Unicode MS" panose="020B0604020202020204" pitchFamily="34" charset="-128"/>
-                <a:cs typeface="Arial Unicode MS" panose="020B0604020202020204" pitchFamily="34" charset="-128"/>
-              </a:rPr>
-              <a:t>Aluno 1</a:t>
-            </a:r>
-            <a:endParaRPr lang="pt-BR" sz="1600" dirty="0">
-              <a:solidFill>
-                <a:srgbClr val="447E43"/>
-              </a:solidFill>
-              <a:latin typeface="Arial Unicode MS" panose="020B0604020202020204" pitchFamily="34" charset="-128"/>
-              <a:ea typeface="Arial Unicode MS" panose="020B0604020202020204" pitchFamily="34" charset="-128"/>
-              <a:cs typeface="Arial Unicode MS" panose="020B0604020202020204" pitchFamily="34" charset="-128"/>
-            </a:endParaRPr>
-          </a:p>
-        </p:txBody>
-      </p:sp>
-      <p:sp>
-        <p:nvSpPr>
-          <p:cNvPr id="38" name="CaixaDeTexto 37"/>
-          <p:cNvSpPr txBox="1"/>
-          <p:nvPr/>
-        </p:nvSpPr>
-        <p:spPr>
-          <a:xfrm>
-            <a:off x="1578990" y="2175944"/>
-            <a:ext cx="940016" cy="338554"/>
-          </a:xfrm>
-          <a:prstGeom prst="rect">
-            <a:avLst/>
-          </a:prstGeom>
-          <a:noFill/>
-        </p:spPr>
-        <p:txBody>
-          <a:bodyPr wrap="square" rtlCol="0">
-            <a:spAutoFit/>
-          </a:bodyPr>
-          <a:lstStyle/>
-          <a:p>
-            <a:r>
-              <a:rPr lang="pt-BR" sz="1600" dirty="0" smtClean="0">
-                <a:solidFill>
-                  <a:srgbClr val="447E43"/>
-                </a:solidFill>
-                <a:latin typeface="Arial Unicode MS" panose="020B0604020202020204" pitchFamily="34" charset="-128"/>
-                <a:ea typeface="Arial Unicode MS" panose="020B0604020202020204" pitchFamily="34" charset="-128"/>
-                <a:cs typeface="Arial Unicode MS" panose="020B0604020202020204" pitchFamily="34" charset="-128"/>
-              </a:rPr>
-              <a:t>Aluno 2</a:t>
-            </a:r>
-            <a:endParaRPr lang="pt-BR" sz="1600" dirty="0">
-              <a:solidFill>
-                <a:srgbClr val="447E43"/>
-              </a:solidFill>
-              <a:latin typeface="Arial Unicode MS" panose="020B0604020202020204" pitchFamily="34" charset="-128"/>
-              <a:ea typeface="Arial Unicode MS" panose="020B0604020202020204" pitchFamily="34" charset="-128"/>
-              <a:cs typeface="Arial Unicode MS" panose="020B0604020202020204" pitchFamily="34" charset="-128"/>
-            </a:endParaRPr>
-          </a:p>
-        </p:txBody>
-      </p:sp>
-      <p:sp>
-        <p:nvSpPr>
-          <p:cNvPr id="39" name="CaixaDeTexto 38"/>
-          <p:cNvSpPr txBox="1"/>
-          <p:nvPr/>
-        </p:nvSpPr>
-        <p:spPr>
-          <a:xfrm>
-            <a:off x="1560817" y="2665495"/>
-            <a:ext cx="976362" cy="338554"/>
-          </a:xfrm>
-          <a:prstGeom prst="rect">
-            <a:avLst/>
-          </a:prstGeom>
-          <a:noFill/>
-        </p:spPr>
-        <p:txBody>
-          <a:bodyPr wrap="square" rtlCol="0">
-            <a:spAutoFit/>
-          </a:bodyPr>
-          <a:lstStyle/>
-          <a:p>
-            <a:r>
-              <a:rPr lang="pt-BR" sz="1600" dirty="0" smtClean="0">
-                <a:solidFill>
-                  <a:srgbClr val="447E43"/>
-                </a:solidFill>
-                <a:latin typeface="Arial Unicode MS" panose="020B0604020202020204" pitchFamily="34" charset="-128"/>
-                <a:ea typeface="Arial Unicode MS" panose="020B0604020202020204" pitchFamily="34" charset="-128"/>
-                <a:cs typeface="Arial Unicode MS" panose="020B0604020202020204" pitchFamily="34" charset="-128"/>
-              </a:rPr>
-              <a:t>Aluno 3</a:t>
-            </a:r>
-            <a:endParaRPr lang="pt-BR" sz="1600" dirty="0">
               <a:solidFill>
                 <a:srgbClr val="447E43"/>
               </a:solidFill>
@@ -16748,6 +16420,46 @@
           </a:p>
         </p:txBody>
       </p:sp>
+      <p:sp>
+        <p:nvSpPr>
+          <p:cNvPr id="11" name="CaixaDeTexto 10"/>
+          <p:cNvSpPr txBox="1"/>
+          <p:nvPr/>
+        </p:nvSpPr>
+        <p:spPr>
+          <a:xfrm>
+            <a:off x="7886124" y="6033745"/>
+            <a:ext cx="4578359" cy="307777"/>
+          </a:xfrm>
+          <a:prstGeom prst="rect">
+            <a:avLst/>
+          </a:prstGeom>
+          <a:noFill/>
+        </p:spPr>
+        <p:txBody>
+          <a:bodyPr wrap="square" rtlCol="0">
+            <a:spAutoFit/>
+          </a:bodyPr>
+          <a:lstStyle/>
+          <a:p>
+            <a:r>
+              <a:rPr lang="pt-BR" sz="1400" dirty="0" smtClean="0">
+                <a:solidFill>
+                  <a:srgbClr val="002060"/>
+                </a:solidFill>
+                <a:latin typeface="Bahnschrift" panose="020B0502040204020203" pitchFamily="34" charset="0"/>
+              </a:rPr>
+              <a:t>Designed by freepik</a:t>
+            </a:r>
+            <a:endParaRPr lang="pt-BR" sz="1400" dirty="0">
+              <a:solidFill>
+                <a:srgbClr val="002060"/>
+              </a:solidFill>
+              <a:latin typeface="Bahnschrift" panose="020B0502040204020203" pitchFamily="34" charset="0"/>
+            </a:endParaRPr>
+          </a:p>
+        </p:txBody>
+      </p:sp>
     </p:spTree>
     <p:extLst>
       <p:ext uri="{BB962C8B-B14F-4D97-AF65-F5344CB8AC3E}">
@@ -17013,15 +16725,7 @@
                   <a:schemeClr val="bg1"/>
                 </a:solidFill>
               </a:rPr>
-              <a:t>Criar </a:t>
-            </a:r>
-            <a:r>
-              <a:rPr lang="pt-BR" dirty="0" smtClean="0">
-                <a:solidFill>
-                  <a:schemeClr val="bg1"/>
-                </a:solidFill>
-              </a:rPr>
-              <a:t>Sala</a:t>
+              <a:t>Criar Sala</a:t>
             </a:r>
             <a:endParaRPr lang="pt-BR" dirty="0">
               <a:solidFill>
@@ -17267,6 +16971,46 @@
               <a:t>HOME</a:t>
             </a:r>
             <a:endParaRPr lang="pt-BR" sz="4400" dirty="0">
+              <a:solidFill>
+                <a:srgbClr val="002060"/>
+              </a:solidFill>
+              <a:latin typeface="Bahnschrift" panose="020B0502040204020203" pitchFamily="34" charset="0"/>
+            </a:endParaRPr>
+          </a:p>
+        </p:txBody>
+      </p:sp>
+      <p:sp>
+        <p:nvSpPr>
+          <p:cNvPr id="11" name="CaixaDeTexto 10"/>
+          <p:cNvSpPr txBox="1"/>
+          <p:nvPr/>
+        </p:nvSpPr>
+        <p:spPr>
+          <a:xfrm>
+            <a:off x="7886124" y="6033745"/>
+            <a:ext cx="4578359" cy="307777"/>
+          </a:xfrm>
+          <a:prstGeom prst="rect">
+            <a:avLst/>
+          </a:prstGeom>
+          <a:noFill/>
+        </p:spPr>
+        <p:txBody>
+          <a:bodyPr wrap="square" rtlCol="0">
+            <a:spAutoFit/>
+          </a:bodyPr>
+          <a:lstStyle/>
+          <a:p>
+            <a:r>
+              <a:rPr lang="pt-BR" sz="1400" dirty="0" smtClean="0">
+                <a:solidFill>
+                  <a:srgbClr val="002060"/>
+                </a:solidFill>
+                <a:latin typeface="Bahnschrift" panose="020B0502040204020203" pitchFamily="34" charset="0"/>
+              </a:rPr>
+              <a:t>Designed by freepik</a:t>
+            </a:r>
+            <a:endParaRPr lang="pt-BR" sz="1400" dirty="0">
               <a:solidFill>
                 <a:srgbClr val="002060"/>
               </a:solidFill>
@@ -17540,15 +17284,7 @@
                   <a:schemeClr val="bg1"/>
                 </a:solidFill>
               </a:rPr>
-              <a:t>Criar </a:t>
-            </a:r>
-            <a:r>
-              <a:rPr lang="pt-BR" dirty="0" smtClean="0">
-                <a:solidFill>
-                  <a:schemeClr val="bg1"/>
-                </a:solidFill>
-              </a:rPr>
-              <a:t>Sala</a:t>
+              <a:t>Criar Sala</a:t>
             </a:r>
             <a:endParaRPr lang="pt-BR" dirty="0">
               <a:solidFill>
@@ -18028,6 +17764,46 @@
             <a:endParaRPr lang="pt-BR" sz="2400" dirty="0">
               <a:solidFill>
                 <a:srgbClr val="447E43"/>
+              </a:solidFill>
+              <a:latin typeface="Bahnschrift" panose="020B0502040204020203" pitchFamily="34" charset="0"/>
+            </a:endParaRPr>
+          </a:p>
+        </p:txBody>
+      </p:sp>
+      <p:sp>
+        <p:nvSpPr>
+          <p:cNvPr id="18" name="CaixaDeTexto 17"/>
+          <p:cNvSpPr txBox="1"/>
+          <p:nvPr/>
+        </p:nvSpPr>
+        <p:spPr>
+          <a:xfrm>
+            <a:off x="7886124" y="6033745"/>
+            <a:ext cx="4578359" cy="307777"/>
+          </a:xfrm>
+          <a:prstGeom prst="rect">
+            <a:avLst/>
+          </a:prstGeom>
+          <a:noFill/>
+        </p:spPr>
+        <p:txBody>
+          <a:bodyPr wrap="square" rtlCol="0">
+            <a:spAutoFit/>
+          </a:bodyPr>
+          <a:lstStyle/>
+          <a:p>
+            <a:r>
+              <a:rPr lang="pt-BR" sz="1400" dirty="0" smtClean="0">
+                <a:solidFill>
+                  <a:srgbClr val="002060"/>
+                </a:solidFill>
+                <a:latin typeface="Bahnschrift" panose="020B0502040204020203" pitchFamily="34" charset="0"/>
+              </a:rPr>
+              <a:t>Designed by freepik</a:t>
+            </a:r>
+            <a:endParaRPr lang="pt-BR" sz="1400" dirty="0">
+              <a:solidFill>
+                <a:srgbClr val="002060"/>
               </a:solidFill>
               <a:latin typeface="Bahnschrift" panose="020B0502040204020203" pitchFamily="34" charset="0"/>
             </a:endParaRPr>
@@ -18299,15 +18075,7 @@
                   <a:schemeClr val="bg1"/>
                 </a:solidFill>
               </a:rPr>
-              <a:t>Criar </a:t>
-            </a:r>
-            <a:r>
-              <a:rPr lang="pt-BR" dirty="0" smtClean="0">
-                <a:solidFill>
-                  <a:schemeClr val="bg1"/>
-                </a:solidFill>
-              </a:rPr>
-              <a:t>Sala</a:t>
+              <a:t>Criar Sala</a:t>
             </a:r>
             <a:endParaRPr lang="pt-BR" dirty="0">
               <a:solidFill>
@@ -18831,6 +18599,46 @@
               <a:t>Histórias</a:t>
             </a:r>
             <a:endParaRPr lang="pt-BR" dirty="0"/>
+          </a:p>
+        </p:txBody>
+      </p:sp>
+      <p:sp>
+        <p:nvSpPr>
+          <p:cNvPr id="26" name="CaixaDeTexto 25"/>
+          <p:cNvSpPr txBox="1"/>
+          <p:nvPr/>
+        </p:nvSpPr>
+        <p:spPr>
+          <a:xfrm>
+            <a:off x="7886124" y="6033745"/>
+            <a:ext cx="4578359" cy="307777"/>
+          </a:xfrm>
+          <a:prstGeom prst="rect">
+            <a:avLst/>
+          </a:prstGeom>
+          <a:noFill/>
+        </p:spPr>
+        <p:txBody>
+          <a:bodyPr wrap="square" rtlCol="0">
+            <a:spAutoFit/>
+          </a:bodyPr>
+          <a:lstStyle/>
+          <a:p>
+            <a:r>
+              <a:rPr lang="pt-BR" sz="1400" dirty="0" smtClean="0">
+                <a:solidFill>
+                  <a:srgbClr val="002060"/>
+                </a:solidFill>
+                <a:latin typeface="Bahnschrift" panose="020B0502040204020203" pitchFamily="34" charset="0"/>
+              </a:rPr>
+              <a:t>Designed by freepik</a:t>
+            </a:r>
+            <a:endParaRPr lang="pt-BR" sz="1400" dirty="0">
+              <a:solidFill>
+                <a:srgbClr val="002060"/>
+              </a:solidFill>
+              <a:latin typeface="Bahnschrift" panose="020B0502040204020203" pitchFamily="34" charset="0"/>
+            </a:endParaRPr>
           </a:p>
         </p:txBody>
       </p:sp>

</xml_diff>